<commit_message>
added PPT for the upcoming session
added day 0 PPT as well as PDF
</commit_message>
<xml_diff>
--- a/PresentationPPTPDFS/Day 0 - C Sharp Workshop Bucks College Group.pptx
+++ b/PresentationPPTPDFS/Day 0 - C Sharp Workshop Bucks College Group.pptx
@@ -5,16 +5,17 @@
     <p:sldMasterId id="2147483705" r:id="rId4"/>
   </p:sldMasterIdLst>
   <p:notesMasterIdLst>
-    <p:notesMasterId r:id="rId9"/>
+    <p:notesMasterId r:id="rId10"/>
   </p:notesMasterIdLst>
   <p:handoutMasterIdLst>
-    <p:handoutMasterId r:id="rId10"/>
+    <p:handoutMasterId r:id="rId11"/>
   </p:handoutMasterIdLst>
   <p:sldIdLst>
     <p:sldId id="1866" r:id="rId5"/>
-    <p:sldId id="1867" r:id="rId6"/>
-    <p:sldId id="1875" r:id="rId7"/>
-    <p:sldId id="1876" r:id="rId8"/>
+    <p:sldId id="1877" r:id="rId6"/>
+    <p:sldId id="1867" r:id="rId7"/>
+    <p:sldId id="1875" r:id="rId8"/>
+    <p:sldId id="1876" r:id="rId9"/>
   </p:sldIdLst>
   <p:sldSz cx="12192000" cy="6858000"/>
   <p:notesSz cx="6858000" cy="9144000"/>
@@ -149,6 +150,7 @@
         <p14:section name="Lines theme" id="{EE9670AD-028C-4190-AAA8-2AF0F3B1E372}">
           <p14:sldIdLst>
             <p14:sldId id="1866"/>
+            <p14:sldId id="1877"/>
             <p14:sldId id="1867"/>
             <p14:sldId id="1875"/>
             <p14:sldId id="1876"/>
@@ -1135,6 +1137,256 @@
       </p:grpSpPr>
       <p:sp>
         <p:nvSpPr>
+          <p:cNvPr id="15362" name="Rectangle 7">
+            <a:extLst>
+              <a:ext uri="{FF2B5EF4-FFF2-40B4-BE49-F238E27FC236}">
+                <a16:creationId xmlns:a16="http://schemas.microsoft.com/office/drawing/2014/main" id="{FA4671F7-4D2C-4B1E-AED7-24676BE8B496}"/>
+              </a:ext>
+            </a:extLst>
+          </p:cNvPr>
+          <p:cNvSpPr>
+            <a:spLocks noGrp="1" noChangeArrowheads="1"/>
+          </p:cNvSpPr>
+          <p:nvPr>
+            <p:ph type="sldNum" sz="quarter" idx="5"/>
+          </p:nvPr>
+        </p:nvSpPr>
+        <p:spPr>
+          <a:noFill/>
+          <a:ln/>
+          <a:extLst>
+            <a:ext uri="{909E8E84-426E-40DD-AFC4-6F175D3DCCD1}">
+              <a14:hiddenFill xmlns:a14="http://schemas.microsoft.com/office/drawing/2010/main">
+                <a:solidFill>
+                  <a:srgbClr val="FFFFFF"/>
+                </a:solidFill>
+              </a14:hiddenFill>
+            </a:ext>
+            <a:ext uri="{91240B29-F687-4F45-9708-019B960494DF}">
+              <a14:hiddenLine xmlns:a14="http://schemas.microsoft.com/office/drawing/2010/main" w="9525">
+                <a:solidFill>
+                  <a:srgbClr val="000000"/>
+                </a:solidFill>
+                <a:miter lim="800000"/>
+                <a:headEnd/>
+                <a:tailEnd/>
+              </a14:hiddenLine>
+            </a:ext>
+          </a:extLst>
+        </p:spPr>
+        <p:txBody>
+          <a:bodyPr/>
+          <a:lstStyle>
+            <a:lvl1pPr eaLnBrk="0" hangingPunct="0">
+              <a:defRPr>
+                <a:solidFill>
+                  <a:schemeClr val="tx1"/>
+                </a:solidFill>
+                <a:latin typeface="Arial" panose="020B0604020202020204" pitchFamily="34" charset="0"/>
+              </a:defRPr>
+            </a:lvl1pPr>
+            <a:lvl2pPr marL="742950" indent="-285750" eaLnBrk="0" hangingPunct="0">
+              <a:defRPr>
+                <a:solidFill>
+                  <a:schemeClr val="tx1"/>
+                </a:solidFill>
+                <a:latin typeface="Arial" panose="020B0604020202020204" pitchFamily="34" charset="0"/>
+              </a:defRPr>
+            </a:lvl2pPr>
+            <a:lvl3pPr marL="1143000" indent="-228600" eaLnBrk="0" hangingPunct="0">
+              <a:defRPr>
+                <a:solidFill>
+                  <a:schemeClr val="tx1"/>
+                </a:solidFill>
+                <a:latin typeface="Arial" panose="020B0604020202020204" pitchFamily="34" charset="0"/>
+              </a:defRPr>
+            </a:lvl3pPr>
+            <a:lvl4pPr marL="1600200" indent="-228600" eaLnBrk="0" hangingPunct="0">
+              <a:defRPr>
+                <a:solidFill>
+                  <a:schemeClr val="tx1"/>
+                </a:solidFill>
+                <a:latin typeface="Arial" panose="020B0604020202020204" pitchFamily="34" charset="0"/>
+              </a:defRPr>
+            </a:lvl4pPr>
+            <a:lvl5pPr marL="2057400" indent="-228600" eaLnBrk="0" hangingPunct="0">
+              <a:defRPr>
+                <a:solidFill>
+                  <a:schemeClr val="tx1"/>
+                </a:solidFill>
+                <a:latin typeface="Arial" panose="020B0604020202020204" pitchFamily="34" charset="0"/>
+              </a:defRPr>
+            </a:lvl5pPr>
+            <a:lvl6pPr marL="2514600" indent="-228600" eaLnBrk="0" fontAlgn="base" hangingPunct="0">
+              <a:spcBef>
+                <a:spcPct val="0"/>
+              </a:spcBef>
+              <a:spcAft>
+                <a:spcPct val="0"/>
+              </a:spcAft>
+              <a:defRPr>
+                <a:solidFill>
+                  <a:schemeClr val="tx1"/>
+                </a:solidFill>
+                <a:latin typeface="Arial" panose="020B0604020202020204" pitchFamily="34" charset="0"/>
+              </a:defRPr>
+            </a:lvl6pPr>
+            <a:lvl7pPr marL="2971800" indent="-228600" eaLnBrk="0" fontAlgn="base" hangingPunct="0">
+              <a:spcBef>
+                <a:spcPct val="0"/>
+              </a:spcBef>
+              <a:spcAft>
+                <a:spcPct val="0"/>
+              </a:spcAft>
+              <a:defRPr>
+                <a:solidFill>
+                  <a:schemeClr val="tx1"/>
+                </a:solidFill>
+                <a:latin typeface="Arial" panose="020B0604020202020204" pitchFamily="34" charset="0"/>
+              </a:defRPr>
+            </a:lvl7pPr>
+            <a:lvl8pPr marL="3429000" indent="-228600" eaLnBrk="0" fontAlgn="base" hangingPunct="0">
+              <a:spcBef>
+                <a:spcPct val="0"/>
+              </a:spcBef>
+              <a:spcAft>
+                <a:spcPct val="0"/>
+              </a:spcAft>
+              <a:defRPr>
+                <a:solidFill>
+                  <a:schemeClr val="tx1"/>
+                </a:solidFill>
+                <a:latin typeface="Arial" panose="020B0604020202020204" pitchFamily="34" charset="0"/>
+              </a:defRPr>
+            </a:lvl8pPr>
+            <a:lvl9pPr marL="3886200" indent="-228600" eaLnBrk="0" fontAlgn="base" hangingPunct="0">
+              <a:spcBef>
+                <a:spcPct val="0"/>
+              </a:spcBef>
+              <a:spcAft>
+                <a:spcPct val="0"/>
+              </a:spcAft>
+              <a:defRPr>
+                <a:solidFill>
+                  <a:schemeClr val="tx1"/>
+                </a:solidFill>
+                <a:latin typeface="Arial" panose="020B0604020202020204" pitchFamily="34" charset="0"/>
+              </a:defRPr>
+            </a:lvl9pPr>
+          </a:lstStyle>
+          <a:p>
+            <a:pPr eaLnBrk="1" hangingPunct="1"/>
+            <a:fld id="{947842D7-C728-4EBD-982B-B8BE79E4DBBE}" type="slidenum">
+              <a:rPr lang="en-US" altLang="en-US"/>
+              <a:pPr eaLnBrk="1" hangingPunct="1"/>
+              <a:t>2</a:t>
+            </a:fld>
+            <a:endParaRPr lang="en-US" altLang="en-US" dirty="0"/>
+          </a:p>
+        </p:txBody>
+      </p:sp>
+      <p:sp>
+        <p:nvSpPr>
+          <p:cNvPr id="15363" name="Rectangle 2">
+            <a:extLst>
+              <a:ext uri="{FF2B5EF4-FFF2-40B4-BE49-F238E27FC236}">
+                <a16:creationId xmlns:a16="http://schemas.microsoft.com/office/drawing/2014/main" id="{D8E83BD0-7AE4-4323-9047-FC368929C520}"/>
+              </a:ext>
+            </a:extLst>
+          </p:cNvPr>
+          <p:cNvSpPr>
+            <a:spLocks noGrp="1" noRot="1" noChangeAspect="1" noChangeArrowheads="1" noTextEdit="1"/>
+          </p:cNvSpPr>
+          <p:nvPr>
+            <p:ph type="sldImg"/>
+          </p:nvPr>
+        </p:nvSpPr>
+        <p:spPr>
+          <a:ln/>
+        </p:spPr>
+      </p:sp>
+      <p:sp>
+        <p:nvSpPr>
+          <p:cNvPr id="15364" name="Rectangle 3">
+            <a:extLst>
+              <a:ext uri="{FF2B5EF4-FFF2-40B4-BE49-F238E27FC236}">
+                <a16:creationId xmlns:a16="http://schemas.microsoft.com/office/drawing/2014/main" id="{FDECF5EC-C5EC-4723-8F4F-A75A20018F65}"/>
+              </a:ext>
+            </a:extLst>
+          </p:cNvPr>
+          <p:cNvSpPr>
+            <a:spLocks noGrp="1" noChangeArrowheads="1"/>
+          </p:cNvSpPr>
+          <p:nvPr>
+            <p:ph type="body" idx="1"/>
+          </p:nvPr>
+        </p:nvSpPr>
+        <p:spPr>
+          <a:noFill/>
+          <a:ln/>
+          <a:extLst>
+            <a:ext uri="{909E8E84-426E-40DD-AFC4-6F175D3DCCD1}">
+              <a14:hiddenFill xmlns:a14="http://schemas.microsoft.com/office/drawing/2010/main">
+                <a:solidFill>
+                  <a:srgbClr val="FFFFFF"/>
+                </a:solidFill>
+              </a14:hiddenFill>
+            </a:ext>
+            <a:ext uri="{91240B29-F687-4F45-9708-019B960494DF}">
+              <a14:hiddenLine xmlns:a14="http://schemas.microsoft.com/office/drawing/2010/main" w="9525">
+                <a:solidFill>
+                  <a:srgbClr val="000000"/>
+                </a:solidFill>
+                <a:miter lim="800000"/>
+                <a:headEnd/>
+                <a:tailEnd/>
+              </a14:hiddenLine>
+            </a:ext>
+          </a:extLst>
+        </p:spPr>
+        <p:txBody>
+          <a:bodyPr/>
+          <a:lstStyle/>
+          <a:p>
+            <a:pPr eaLnBrk="1" hangingPunct="1"/>
+            <a:endParaRPr lang="en-US" altLang="en-US" dirty="0">
+              <a:latin typeface="Arial" panose="020B0604020202020204" pitchFamily="34" charset="0"/>
+            </a:endParaRPr>
+          </a:p>
+        </p:txBody>
+      </p:sp>
+    </p:spTree>
+    <p:extLst>
+      <p:ext uri="{BB962C8B-B14F-4D97-AF65-F5344CB8AC3E}">
+        <p14:creationId xmlns:p14="http://schemas.microsoft.com/office/powerpoint/2010/main" val="183380407"/>
+      </p:ext>
+    </p:extLst>
+  </p:cSld>
+  <p:clrMapOvr>
+    <a:masterClrMapping/>
+  </p:clrMapOvr>
+</p:notes>
+</file>
+
+<file path=ppt/notesSlides/notesSlide3.xml><?xml version="1.0" encoding="utf-8"?>
+<p:notes xmlns:a="http://schemas.openxmlformats.org/drawingml/2006/main" xmlns:r="http://schemas.openxmlformats.org/officeDocument/2006/relationships" xmlns:p="http://schemas.openxmlformats.org/presentationml/2006/main">
+  <p:cSld>
+    <p:spTree>
+      <p:nvGrpSpPr>
+        <p:cNvPr id="1" name=""/>
+        <p:cNvGrpSpPr/>
+        <p:nvPr/>
+      </p:nvGrpSpPr>
+      <p:grpSpPr>
+        <a:xfrm>
+          <a:off x="0" y="0"/>
+          <a:ext cx="0" cy="0"/>
+          <a:chOff x="0" y="0"/>
+          <a:chExt cx="0" cy="0"/>
+        </a:xfrm>
+      </p:grpSpPr>
+      <p:sp>
+        <p:nvSpPr>
           <p:cNvPr id="2" name="Slide Image Placeholder 1"/>
           <p:cNvSpPr>
             <a:spLocks noGrp="1" noRot="1" noChangeAspect="1"/>
@@ -1182,7 +1434,7 @@
             <a:fld id="{6DEB7EE2-04A2-4FB2-9625-C9C73AC4D32F}" type="slidenum">
               <a:rPr lang="en-US" altLang="en-US" smtClean="0"/>
               <a:pPr/>
-              <a:t>3</a:t>
+              <a:t>4</a:t>
             </a:fld>
             <a:endParaRPr lang="en-US" altLang="en-US" dirty="0"/>
           </a:p>
@@ -4433,6 +4685,145 @@
 <file path=ppt/slides/slide2.xml><?xml version="1.0" encoding="utf-8"?>
 <p:sld xmlns:a="http://schemas.openxmlformats.org/drawingml/2006/main" xmlns:r="http://schemas.openxmlformats.org/officeDocument/2006/relationships" xmlns:p="http://schemas.openxmlformats.org/presentationml/2006/main">
   <p:cSld>
+    <p:spTree>
+      <p:nvGrpSpPr>
+        <p:cNvPr id="1" name=""/>
+        <p:cNvGrpSpPr/>
+        <p:nvPr/>
+      </p:nvGrpSpPr>
+      <p:grpSpPr>
+        <a:xfrm>
+          <a:off x="0" y="0"/>
+          <a:ext cx="0" cy="0"/>
+          <a:chOff x="0" y="0"/>
+          <a:chExt cx="0" cy="0"/>
+        </a:xfrm>
+      </p:grpSpPr>
+      <p:sp>
+        <p:nvSpPr>
+          <p:cNvPr id="6" name="Title 5">
+            <a:extLst>
+              <a:ext uri="{FF2B5EF4-FFF2-40B4-BE49-F238E27FC236}">
+                <a16:creationId xmlns:a16="http://schemas.microsoft.com/office/drawing/2014/main" id="{F168E5CF-FC82-40DA-8E6D-0BFF887BD80E}"/>
+              </a:ext>
+            </a:extLst>
+          </p:cNvPr>
+          <p:cNvSpPr>
+            <a:spLocks noGrp="1"/>
+          </p:cNvSpPr>
+          <p:nvPr>
+            <p:ph type="title"/>
+          </p:nvPr>
+        </p:nvSpPr>
+        <p:spPr>
+          <a:xfrm>
+            <a:off x="2584704" y="3161984"/>
+            <a:ext cx="7022592" cy="2258568"/>
+          </a:xfrm>
+        </p:spPr>
+        <p:txBody>
+          <a:bodyPr anchor="ctr">
+            <a:normAutofit/>
+          </a:bodyPr>
+          <a:lstStyle/>
+          <a:p>
+            <a:r>
+              <a:rPr lang="en-US" sz="2800" b="1" dirty="0"/>
+              <a:t>Programming Tutor: Jay (Vijayasimha BR)</a:t>
+            </a:r>
+          </a:p>
+        </p:txBody>
+      </p:sp>
+      <p:sp>
+        <p:nvSpPr>
+          <p:cNvPr id="2" name="Title 5">
+            <a:extLst>
+              <a:ext uri="{FF2B5EF4-FFF2-40B4-BE49-F238E27FC236}">
+                <a16:creationId xmlns:a16="http://schemas.microsoft.com/office/drawing/2014/main" id="{B723D126-04BF-DEE6-BDBC-25444CCA6A51}"/>
+              </a:ext>
+            </a:extLst>
+          </p:cNvPr>
+          <p:cNvSpPr txBox="1">
+            <a:spLocks/>
+          </p:cNvSpPr>
+          <p:nvPr/>
+        </p:nvSpPr>
+        <p:spPr>
+          <a:xfrm>
+            <a:off x="2897958" y="912560"/>
+            <a:ext cx="7022592" cy="2258568"/>
+          </a:xfrm>
+          <a:prstGeom prst="rect">
+            <a:avLst/>
+          </a:prstGeom>
+        </p:spPr>
+        <p:txBody>
+          <a:bodyPr vert="horz" lIns="91440" tIns="45720" rIns="91440" bIns="45720" rtlCol="0" anchor="ctr">
+            <a:normAutofit/>
+          </a:bodyPr>
+          <a:lstStyle>
+            <a:lvl1pPr algn="ctr" defTabSz="914400" rtl="0" eaLnBrk="1" latinLnBrk="0" hangingPunct="1">
+              <a:lnSpc>
+                <a:spcPct val="90000"/>
+              </a:lnSpc>
+              <a:spcBef>
+                <a:spcPct val="0"/>
+              </a:spcBef>
+              <a:buNone/>
+              <a:defRPr lang="en-US" sz="4800" b="1" kern="1200">
+                <a:solidFill>
+                  <a:schemeClr val="accent4">
+                    <a:lumMod val="75000"/>
+                  </a:schemeClr>
+                </a:solidFill>
+                <a:latin typeface="+mj-lt"/>
+                <a:ea typeface="+mn-ea"/>
+                <a:cs typeface="+mn-cs"/>
+              </a:defRPr>
+            </a:lvl1pPr>
+          </a:lstStyle>
+          <a:p>
+            <a:pPr fontAlgn="auto">
+              <a:spcAft>
+                <a:spcPts val="0"/>
+              </a:spcAft>
+            </a:pPr>
+            <a:r>
+              <a:rPr lang="en-US" dirty="0" err="1"/>
+              <a:t>CSharpWorkShopJayBucksGroup</a:t>
+            </a:r>
+            <a:endParaRPr lang="en-US" dirty="0"/>
+          </a:p>
+        </p:txBody>
+      </p:sp>
+    </p:spTree>
+    <p:extLst>
+      <p:ext uri="{BB962C8B-B14F-4D97-AF65-F5344CB8AC3E}">
+        <p14:creationId xmlns:p14="http://schemas.microsoft.com/office/powerpoint/2010/main" val="1129806789"/>
+      </p:ext>
+    </p:extLst>
+  </p:cSld>
+  <p:clrMapOvr>
+    <a:masterClrMapping/>
+  </p:clrMapOvr>
+  <mc:AlternateContent xmlns:mc="http://schemas.openxmlformats.org/markup-compatibility/2006">
+    <mc:Choice xmlns:p14="http://schemas.microsoft.com/office/powerpoint/2010/main" Requires="p14">
+      <p:transition spd="med" p14:dur="700">
+        <p:fade/>
+      </p:transition>
+    </mc:Choice>
+    <mc:Fallback>
+      <p:transition spd="med">
+        <p:fade/>
+      </p:transition>
+    </mc:Fallback>
+  </mc:AlternateContent>
+</p:sld>
+</file>
+
+<file path=ppt/slides/slide3.xml><?xml version="1.0" encoding="utf-8"?>
+<p:sld xmlns:a="http://schemas.openxmlformats.org/drawingml/2006/main" xmlns:r="http://schemas.openxmlformats.org/officeDocument/2006/relationships" xmlns:p="http://schemas.openxmlformats.org/presentationml/2006/main">
+  <p:cSld>
     <p:bg>
       <p:bgPr>
         <a:solidFill>
@@ -4657,7 +5048,7 @@
 </p:sld>
 </file>
 
-<file path=ppt/slides/slide3.xml><?xml version="1.0" encoding="utf-8"?>
+<file path=ppt/slides/slide4.xml><?xml version="1.0" encoding="utf-8"?>
 <p:sld xmlns:a="http://schemas.openxmlformats.org/drawingml/2006/main" xmlns:r="http://schemas.openxmlformats.org/officeDocument/2006/relationships" xmlns:p="http://schemas.openxmlformats.org/presentationml/2006/main">
   <p:cSld>
     <p:spTree>
@@ -4943,7 +5334,7 @@
 </p:sld>
 </file>
 
-<file path=ppt/slides/slide4.xml><?xml version="1.0" encoding="utf-8"?>
+<file path=ppt/slides/slide5.xml><?xml version="1.0" encoding="utf-8"?>
 <p:sld xmlns:a="http://schemas.openxmlformats.org/drawingml/2006/main" xmlns:r="http://schemas.openxmlformats.org/officeDocument/2006/relationships" xmlns:p="http://schemas.openxmlformats.org/presentationml/2006/main">
   <p:cSld>
     <p:spTree>
@@ -6228,6 +6619,15 @@
 </file>
 
 <file path=customXml/item2.xml><?xml version="1.0" encoding="utf-8"?>
+<?mso-contentType ?>
+<FormTemplates xmlns="http://schemas.microsoft.com/sharepoint/v3/contenttype/forms">
+  <Display>DocumentLibraryForm</Display>
+  <Edit>DocumentLibraryForm</Edit>
+  <New>DocumentLibraryForm</New>
+</FormTemplates>
+</file>
+
+<file path=customXml/item3.xml><?xml version="1.0" encoding="utf-8"?>
 <p:properties xmlns:p="http://schemas.microsoft.com/office/2006/metadata/properties" xmlns:xsi="http://www.w3.org/2001/XMLSchema-instance" xmlns:pc="http://schemas.microsoft.com/office/infopath/2007/PartnerControls">
   <documentManagement>
     <Status xmlns="71af3243-3dd4-4a8d-8c0d-dd76da1f02a5">Not started</Status>
@@ -6244,15 +6644,6 @@
     <MediaServiceKeyPoints xmlns="71af3243-3dd4-4a8d-8c0d-dd76da1f02a5" xsi:nil="true"/>
   </documentManagement>
 </p:properties>
-</file>
-
-<file path=customXml/item3.xml><?xml version="1.0" encoding="utf-8"?>
-<?mso-contentType ?>
-<FormTemplates xmlns="http://schemas.microsoft.com/sharepoint/v3/contenttype/forms">
-  <Display>DocumentLibraryForm</Display>
-  <Edit>DocumentLibraryForm</Edit>
-  <New>DocumentLibraryForm</New>
-</FormTemplates>
 </file>
 
 <file path=customXml/itemProps1.xml><?xml version="1.0" encoding="utf-8"?>
@@ -6277,6 +6668,14 @@
 </file>
 
 <file path=customXml/itemProps2.xml><?xml version="1.0" encoding="utf-8"?>
+<ds:datastoreItem xmlns:ds="http://schemas.openxmlformats.org/officeDocument/2006/customXml" ds:itemID="{0F9CE79C-5104-4273-B83B-D03AD839A8F7}">
+  <ds:schemaRefs>
+    <ds:schemaRef ds:uri="http://schemas.microsoft.com/sharepoint/v3/contenttype/forms"/>
+  </ds:schemaRefs>
+</ds:datastoreItem>
+</file>
+
+<file path=customXml/itemProps3.xml><?xml version="1.0" encoding="utf-8"?>
 <ds:datastoreItem xmlns:ds="http://schemas.openxmlformats.org/officeDocument/2006/customXml" ds:itemID="{4E18D074-6F3D-488C-8220-03C2DEFDE854}">
   <ds:schemaRefs>
     <ds:schemaRef ds:uri="http://schemas.microsoft.com/office/2006/metadata/properties"/>
@@ -6286,12 +6685,4 @@
     <ds:schemaRef ds:uri="230e9df3-be65-4c73-a93b-d1236ebd677e"/>
   </ds:schemaRefs>
 </ds:datastoreItem>
-</file>
-
-<file path=customXml/itemProps3.xml><?xml version="1.0" encoding="utf-8"?>
-<ds:datastoreItem xmlns:ds="http://schemas.openxmlformats.org/officeDocument/2006/customXml" ds:itemID="{0F9CE79C-5104-4273-B83B-D03AD839A8F7}">
-  <ds:schemaRefs>
-    <ds:schemaRef ds:uri="http://schemas.microsoft.com/sharepoint/v3/contenttype/forms"/>
-  </ds:schemaRefs>
-</ds:datastoreItem>
 </file>
</xml_diff>